<commit_message>
Update little language powerpoint
</commit_message>
<xml_diff>
--- a/little-language/little language - simple search expression language/little-language.pptx
+++ b/little-language/little language - simple search expression language/little-language.pptx
@@ -4140,8 +4140,17 @@
               <a:rPr lang="en-US" dirty="0" smtClean="0">
                 <a:cs typeface="Courier New"/>
               </a:rPr>
-              <a:t>A grammar defines the rules (a.k.a. productions) of the language syntax in terms of terminal and non-terminal symbols.</a:t>
-            </a:r>
+              <a:t>A grammar defines the rules (a.k.a. productions) of the language syntax in terms of terminal and non-terminal symbols</a:t>
+            </a:r>
+            <a:r>
+              <a:rPr lang="en-US" dirty="0" smtClean="0">
+                <a:cs typeface="Courier New"/>
+              </a:rPr>
+              <a:t>. Operator precedence is NOT, AND, OR.</a:t>
+            </a:r>
+            <a:endParaRPr lang="en-US" dirty="0" smtClean="0">
+              <a:cs typeface="Courier New"/>
+            </a:endParaRPr>
           </a:p>
           <a:p>
             <a:pPr marL="0" indent="0">

</xml_diff>

<commit_message>
Added another example of a little language
</commit_message>
<xml_diff>
--- a/little-language/little language - simple search expression language/little-language.pptx
+++ b/little-language/little language - simple search expression language/little-language.pptx
@@ -3723,6 +3723,13 @@
   <p:clrMapOvr>
     <a:masterClrMapping/>
   </p:clrMapOvr>
+  <p:timing>
+    <p:tnLst>
+      <p:par>
+        <p:cTn xmlns:p14="http://schemas.microsoft.com/office/powerpoint/2010/main" id="1" dur="indefinite" restart="never" nodeType="tmRoot"/>
+      </p:par>
+    </p:tnLst>
+  </p:timing>
 </p:sld>
 </file>
 
@@ -3803,6 +3810,13 @@
   <p:clrMapOvr>
     <a:masterClrMapping/>
   </p:clrMapOvr>
+  <p:timing>
+    <p:tnLst>
+      <p:par>
+        <p:cTn xmlns:p14="http://schemas.microsoft.com/office/powerpoint/2010/main" id="1" dur="indefinite" restart="never" nodeType="tmRoot"/>
+      </p:par>
+    </p:tnLst>
+  </p:timing>
 </p:sld>
 </file>
 
@@ -3865,7 +3879,19 @@
           <a:p>
             <a:r>
               <a:rPr lang="en-US" dirty="0" smtClean="0"/>
-              <a:t>I want to create a simple language that will allow my users to express a simple search query.</a:t>
+              <a:t>I want to create a </a:t>
+            </a:r>
+            <a:r>
+              <a:rPr lang="en-US" dirty="0" smtClean="0"/>
+              <a:t>little</a:t>
+            </a:r>
+            <a:r>
+              <a:rPr lang="en-US" dirty="0" smtClean="0"/>
+              <a:t> </a:t>
+            </a:r>
+            <a:r>
+              <a:rPr lang="en-US" dirty="0" smtClean="0"/>
+              <a:t>language that will allow my users to express a simple search query.</a:t>
             </a:r>
           </a:p>
           <a:p>
@@ -3930,6 +3956,13 @@
   <p:clrMapOvr>
     <a:masterClrMapping/>
   </p:clrMapOvr>
+  <p:timing>
+    <p:tnLst>
+      <p:par>
+        <p:cTn xmlns:p14="http://schemas.microsoft.com/office/powerpoint/2010/main" id="1" dur="indefinite" restart="never" nodeType="tmRoot"/>
+      </p:par>
+    </p:tnLst>
+  </p:timing>
 </p:sld>
 </file>
 
@@ -3986,7 +4019,7 @@
         <p:spPr/>
         <p:txBody>
           <a:bodyPr>
-            <a:normAutofit fontScale="92500" lnSpcReduction="20000"/>
+            <a:normAutofit fontScale="85000" lnSpcReduction="20000"/>
           </a:bodyPr>
           <a:lstStyle/>
           <a:p>
@@ -4026,8 +4059,13 @@
           <a:p>
             <a:r>
               <a:rPr lang="en-US" dirty="0" smtClean="0"/>
-              <a:t>Creating a simple parser by hand gives me the following:</a:t>
-            </a:r>
+              <a:t>Creating a simple parser by hand gives me the </a:t>
+            </a:r>
+            <a:r>
+              <a:rPr lang="en-US" dirty="0" smtClean="0"/>
+              <a:t>following benefits:</a:t>
+            </a:r>
+            <a:endParaRPr lang="en-US" dirty="0" smtClean="0"/>
           </a:p>
           <a:p>
             <a:pPr lvl="1"/>
@@ -4057,7 +4095,15 @@
           <a:p>
             <a:r>
               <a:rPr lang="en-US" dirty="0" smtClean="0"/>
-              <a:t>Knowing how to create a simple parser by hand makes it easier to understand and customize the behavior of parser generators, which is useful for when you want to tackle a more complex DSL.  </a:t>
+              <a:t>Knowing how to create a simple parser by hand </a:t>
+            </a:r>
+            <a:r>
+              <a:rPr lang="en-US" dirty="0" smtClean="0"/>
+              <a:t>also makes </a:t>
+            </a:r>
+            <a:r>
+              <a:rPr lang="en-US" dirty="0" smtClean="0"/>
+              <a:t>it easier to understand and customize the behavior of parser generators, which is useful for when you want to tackle a more complex DSL.  </a:t>
             </a:r>
             <a:endParaRPr lang="en-US" dirty="0"/>
           </a:p>
@@ -4073,6 +4119,13 @@
   <p:clrMapOvr>
     <a:masterClrMapping/>
   </p:clrMapOvr>
+  <p:timing>
+    <p:tnLst>
+      <p:par>
+        <p:cTn xmlns:p14="http://schemas.microsoft.com/office/powerpoint/2010/main" id="1" dur="indefinite" restart="never" nodeType="tmRoot"/>
+      </p:par>
+    </p:tnLst>
+  </p:timing>
 </p:sld>
 </file>
 
@@ -4575,6 +4628,13 @@
   <p:clrMapOvr>
     <a:masterClrMapping/>
   </p:clrMapOvr>
+  <p:timing>
+    <p:tnLst>
+      <p:par>
+        <p:cTn xmlns:p14="http://schemas.microsoft.com/office/powerpoint/2010/main" id="1" dur="indefinite" restart="never" nodeType="tmRoot"/>
+      </p:par>
+    </p:tnLst>
+  </p:timing>
 </p:sld>
 </file>
 
@@ -4707,6 +4767,13 @@
   <p:clrMapOvr>
     <a:masterClrMapping/>
   </p:clrMapOvr>
+  <p:timing>
+    <p:tnLst>
+      <p:par>
+        <p:cTn xmlns:p14="http://schemas.microsoft.com/office/powerpoint/2010/main" id="1" dur="indefinite" restart="never" nodeType="tmRoot"/>
+      </p:par>
+    </p:tnLst>
+  </p:timing>
 </p:sld>
 </file>
 
@@ -4790,6 +4857,13 @@
   <p:clrMapOvr>
     <a:masterClrMapping/>
   </p:clrMapOvr>
+  <p:timing>
+    <p:tnLst>
+      <p:par>
+        <p:cTn xmlns:p14="http://schemas.microsoft.com/office/powerpoint/2010/main" id="1" dur="indefinite" restart="never" nodeType="tmRoot"/>
+      </p:par>
+    </p:tnLst>
+  </p:timing>
 </p:sld>
 </file>
 
@@ -5408,6 +5482,13 @@
   <p:clrMapOvr>
     <a:masterClrMapping/>
   </p:clrMapOvr>
+  <p:timing>
+    <p:tnLst>
+      <p:par>
+        <p:cTn xmlns:p14="http://schemas.microsoft.com/office/powerpoint/2010/main" id="1" dur="indefinite" restart="never" nodeType="tmRoot"/>
+      </p:par>
+    </p:tnLst>
+  </p:timing>
 </p:sld>
 </file>
 
@@ -5564,6 +5645,13 @@
   <p:clrMapOvr>
     <a:masterClrMapping/>
   </p:clrMapOvr>
+  <p:timing>
+    <p:tnLst>
+      <p:par>
+        <p:cTn xmlns:p14="http://schemas.microsoft.com/office/powerpoint/2010/main" id="1" dur="indefinite" restart="never" nodeType="tmRoot"/>
+      </p:par>
+    </p:tnLst>
+  </p:timing>
 </p:sld>
 </file>
 
@@ -5668,7 +5756,19 @@
             </a:r>
             <a:r>
               <a:rPr lang="en-US" dirty="0" smtClean="0"/>
-              <a:t>, the sequence of produced by consecutive calls to </a:t>
+              <a:t>, the sequence </a:t>
+            </a:r>
+            <a:r>
+              <a:rPr lang="en-US" smtClean="0"/>
+              <a:t>of </a:t>
+            </a:r>
+            <a:r>
+              <a:rPr lang="en-US" smtClean="0"/>
+              <a:t>tokens produced </a:t>
+            </a:r>
+            <a:r>
+              <a:rPr lang="en-US" dirty="0" smtClean="0"/>
+              <a:t>by consecutive calls to </a:t>
             </a:r>
             <a:r>
               <a:rPr lang="en-US" dirty="0" err="1" smtClean="0"/>
@@ -5917,6 +6017,13 @@
   <p:clrMapOvr>
     <a:masterClrMapping/>
   </p:clrMapOvr>
+  <p:timing>
+    <p:tnLst>
+      <p:par>
+        <p:cTn xmlns:p14="http://schemas.microsoft.com/office/powerpoint/2010/main" id="1" dur="indefinite" restart="never" nodeType="tmRoot"/>
+      </p:par>
+    </p:tnLst>
+  </p:timing>
 </p:sld>
 </file>
 

</xml_diff>